<commit_message>
March 2014 class registration
</commit_message>
<xml_diff>
--- a/_site/docs/Syllabus.pptx
+++ b/_site/docs/Syllabus.pptx
@@ -420,7 +420,7 @@
           <a:p>
             <a:fld id="{B1A24CD3-204F-4468-8EE4-28A6668D006A}" type="datetimeFigureOut">
               <a:rPr lang="en-US" smtClean="0"/>
-              <a:t>10/6/13</a:t>
+              <a:t>2/8/14</a:t>
             </a:fld>
             <a:endParaRPr lang="en-US"/>
           </a:p>
@@ -706,7 +706,7 @@
           <a:p>
             <a:fld id="{B1A24CD3-204F-4468-8EE4-28A6668D006A}" type="datetimeFigureOut">
               <a:rPr lang="en-US" smtClean="0"/>
-              <a:t>10/6/13</a:t>
+              <a:t>2/8/14</a:t>
             </a:fld>
             <a:endParaRPr lang="en-US"/>
           </a:p>
@@ -1128,7 +1128,7 @@
           <a:p>
             <a:fld id="{B1A24CD3-204F-4468-8EE4-28A6668D006A}" type="datetimeFigureOut">
               <a:rPr lang="en-US" smtClean="0"/>
-              <a:t>10/6/13</a:t>
+              <a:t>2/8/14</a:t>
             </a:fld>
             <a:endParaRPr lang="en-US"/>
           </a:p>
@@ -1545,7 +1545,7 @@
           <a:p>
             <a:fld id="{B1A24CD3-204F-4468-8EE4-28A6668D006A}" type="datetimeFigureOut">
               <a:rPr lang="en-US" smtClean="0"/>
-              <a:t>10/6/13</a:t>
+              <a:t>2/8/14</a:t>
             </a:fld>
             <a:endParaRPr lang="en-US"/>
           </a:p>
@@ -1678,7 +1678,7 @@
           <a:p>
             <a:fld id="{B1A24CD3-204F-4468-8EE4-28A6668D006A}" type="datetimeFigureOut">
               <a:rPr lang="en-US" smtClean="0"/>
-              <a:t>10/6/13</a:t>
+              <a:t>2/8/14</a:t>
             </a:fld>
             <a:endParaRPr lang="en-US"/>
           </a:p>
@@ -2000,7 +2000,7 @@
           <a:p>
             <a:fld id="{B1A24CD3-204F-4468-8EE4-28A6668D006A}" type="datetimeFigureOut">
               <a:rPr lang="en-US" smtClean="0"/>
-              <a:t>10/6/13</a:t>
+              <a:t>2/8/14</a:t>
             </a:fld>
             <a:endParaRPr lang="en-US"/>
           </a:p>
@@ -2244,7 +2244,7 @@
           <a:p>
             <a:fld id="{B1A24CD3-204F-4468-8EE4-28A6668D006A}" type="datetimeFigureOut">
               <a:rPr lang="en-US" smtClean="0"/>
-              <a:t>10/6/13</a:t>
+              <a:t>2/8/14</a:t>
             </a:fld>
             <a:endParaRPr lang="en-US"/>
           </a:p>
@@ -2582,7 +2582,7 @@
           <a:p>
             <a:fld id="{B1A24CD3-204F-4468-8EE4-28A6668D006A}" type="datetimeFigureOut">
               <a:rPr lang="en-US" smtClean="0"/>
-              <a:t>10/6/13</a:t>
+              <a:t>2/8/14</a:t>
             </a:fld>
             <a:endParaRPr lang="en-US"/>
           </a:p>
@@ -2882,7 +2882,7 @@
           <a:p>
             <a:fld id="{B1A24CD3-204F-4468-8EE4-28A6668D006A}" type="datetimeFigureOut">
               <a:rPr lang="en-US" smtClean="0"/>
-              <a:t>10/6/13</a:t>
+              <a:t>2/8/14</a:t>
             </a:fld>
             <a:endParaRPr lang="en-US"/>
           </a:p>
@@ -3289,7 +3289,7 @@
           <a:p>
             <a:fld id="{B1A24CD3-204F-4468-8EE4-28A6668D006A}" type="datetimeFigureOut">
               <a:rPr lang="en-US" smtClean="0"/>
-              <a:t>10/6/13</a:t>
+              <a:t>2/8/14</a:t>
             </a:fld>
             <a:endParaRPr lang="en-US"/>
           </a:p>
@@ -3511,7 +3511,7 @@
           <a:p>
             <a:fld id="{B1A24CD3-204F-4468-8EE4-28A6668D006A}" type="datetimeFigureOut">
               <a:rPr lang="en-US" smtClean="0"/>
-              <a:t>10/6/13</a:t>
+              <a:t>2/8/14</a:t>
             </a:fld>
             <a:endParaRPr lang="en-US"/>
           </a:p>
@@ -3728,7 +3728,7 @@
           <a:p>
             <a:fld id="{B1A24CD3-204F-4468-8EE4-28A6668D006A}" type="datetimeFigureOut">
               <a:rPr lang="en-US" smtClean="0"/>
-              <a:t>10/6/13</a:t>
+              <a:t>2/8/14</a:t>
             </a:fld>
             <a:endParaRPr lang="en-US"/>
           </a:p>
@@ -4033,7 +4033,7 @@
           <a:p>
             <a:fld id="{B1A24CD3-204F-4468-8EE4-28A6668D006A}" type="datetimeFigureOut">
               <a:rPr lang="en-US" smtClean="0"/>
-              <a:t>10/6/13</a:t>
+              <a:t>2/8/14</a:t>
             </a:fld>
             <a:endParaRPr lang="en-US"/>
           </a:p>
@@ -4360,7 +4360,7 @@
           <a:p>
             <a:fld id="{B1A24CD3-204F-4468-8EE4-28A6668D006A}" type="datetimeFigureOut">
               <a:rPr lang="en-US" smtClean="0"/>
-              <a:t>10/6/13</a:t>
+              <a:t>2/8/14</a:t>
             </a:fld>
             <a:endParaRPr lang="en-US"/>
           </a:p>
@@ -4695,7 +4695,7 @@
           <a:p>
             <a:fld id="{B1A24CD3-204F-4468-8EE4-28A6668D006A}" type="datetimeFigureOut">
               <a:rPr lang="en-US" smtClean="0"/>
-              <a:t>10/6/13</a:t>
+              <a:t>2/8/14</a:t>
             </a:fld>
             <a:endParaRPr lang="en-US"/>
           </a:p>
@@ -5318,7 +5318,7 @@
           <a:p>
             <a:fld id="{B1A24CD3-204F-4468-8EE4-28A6668D006A}" type="datetimeFigureOut">
               <a:rPr lang="en-US" smtClean="0"/>
-              <a:t>10/6/13</a:t>
+              <a:t>2/8/14</a:t>
             </a:fld>
             <a:endParaRPr lang="en-US"/>
           </a:p>
@@ -5805,7 +5805,7 @@
           <a:p>
             <a:fld id="{B1A24CD3-204F-4468-8EE4-28A6668D006A}" type="datetimeFigureOut">
               <a:rPr lang="en-US" smtClean="0"/>
-              <a:t>10/6/13</a:t>
+              <a:t>2/8/14</a:t>
             </a:fld>
             <a:endParaRPr lang="en-US"/>
           </a:p>
@@ -6053,7 +6053,7 @@
           <a:p>
             <a:fld id="{B1A24CD3-204F-4468-8EE4-28A6668D006A}" type="datetimeFigureOut">
               <a:rPr lang="en-US" smtClean="0"/>
-              <a:t>10/6/13</a:t>
+              <a:t>2/8/14</a:t>
             </a:fld>
             <a:endParaRPr lang="en-US"/>
           </a:p>
@@ -6349,7 +6349,7 @@
           <a:p>
             <a:fld id="{B1A24CD3-204F-4468-8EE4-28A6668D006A}" type="datetimeFigureOut">
               <a:rPr lang="en-US" smtClean="0"/>
-              <a:t>10/6/13</a:t>
+              <a:t>2/8/14</a:t>
             </a:fld>
             <a:endParaRPr lang="en-US"/>
           </a:p>
@@ -6810,7 +6810,11 @@
           <a:p>
             <a:r>
               <a:rPr lang="en-US" dirty="0" smtClean="0"/>
-              <a:t>Fun in programming, 2013</a:t>
+              <a:t>Fun in programming, </a:t>
+            </a:r>
+            <a:r>
+              <a:rPr lang="en-US" dirty="0" smtClean="0"/>
+              <a:t>March 2014</a:t>
             </a:r>
             <a:endParaRPr lang="en-US" dirty="0"/>
           </a:p>

</xml_diff>